<commit_message>
manner type widget step 1
</commit_message>
<xml_diff>
--- a/image/icon.pptx
+++ b/image/icon.pptx
@@ -6,6 +6,7 @@
   </p:sldMasterIdLst>
   <p:sldIdLst>
     <p:sldId id="256" r:id="rId2"/>
+    <p:sldId id="257" r:id="rId3"/>
   </p:sldIdLst>
   <p:sldSz cx="9144000" cy="6858000" type="screen4x3"/>
   <p:notesSz cx="6858000" cy="9144000"/>
@@ -288,7 +289,7 @@
           <a:p>
             <a:fld id="{5F435959-F0A5-4E74-91C9-3CA03D403E3A}" type="datetimeFigureOut">
               <a:rPr kumimoji="1" lang="ja-JP" altLang="en-US" smtClean="0"/>
-              <a:t>2015/8/3</a:t>
+              <a:t>2016/7/3</a:t>
             </a:fld>
             <a:endParaRPr kumimoji="1" lang="ja-JP" altLang="en-US"/>
           </a:p>
@@ -490,7 +491,7 @@
           <a:p>
             <a:fld id="{5F435959-F0A5-4E74-91C9-3CA03D403E3A}" type="datetimeFigureOut">
               <a:rPr kumimoji="1" lang="ja-JP" altLang="en-US" smtClean="0"/>
-              <a:t>2015/8/3</a:t>
+              <a:t>2016/7/3</a:t>
             </a:fld>
             <a:endParaRPr kumimoji="1" lang="ja-JP" altLang="en-US"/>
           </a:p>
@@ -702,7 +703,7 @@
           <a:p>
             <a:fld id="{5F435959-F0A5-4E74-91C9-3CA03D403E3A}" type="datetimeFigureOut">
               <a:rPr kumimoji="1" lang="ja-JP" altLang="en-US" smtClean="0"/>
-              <a:t>2015/8/3</a:t>
+              <a:t>2016/7/3</a:t>
             </a:fld>
             <a:endParaRPr kumimoji="1" lang="ja-JP" altLang="en-US"/>
           </a:p>
@@ -904,7 +905,7 @@
           <a:p>
             <a:fld id="{5F435959-F0A5-4E74-91C9-3CA03D403E3A}" type="datetimeFigureOut">
               <a:rPr kumimoji="1" lang="ja-JP" altLang="en-US" smtClean="0"/>
-              <a:t>2015/8/3</a:t>
+              <a:t>2016/7/3</a:t>
             </a:fld>
             <a:endParaRPr kumimoji="1" lang="ja-JP" altLang="en-US"/>
           </a:p>
@@ -1150,7 +1151,7 @@
           <a:p>
             <a:fld id="{5F435959-F0A5-4E74-91C9-3CA03D403E3A}" type="datetimeFigureOut">
               <a:rPr kumimoji="1" lang="ja-JP" altLang="en-US" smtClean="0"/>
-              <a:t>2015/8/3</a:t>
+              <a:t>2016/7/3</a:t>
             </a:fld>
             <a:endParaRPr kumimoji="1" lang="ja-JP" altLang="en-US"/>
           </a:p>
@@ -1502,7 +1503,7 @@
           <a:p>
             <a:fld id="{5F435959-F0A5-4E74-91C9-3CA03D403E3A}" type="datetimeFigureOut">
               <a:rPr kumimoji="1" lang="ja-JP" altLang="en-US" smtClean="0"/>
-              <a:t>2015/8/3</a:t>
+              <a:t>2016/7/3</a:t>
             </a:fld>
             <a:endParaRPr kumimoji="1" lang="ja-JP" altLang="en-US"/>
           </a:p>
@@ -1988,7 +1989,7 @@
           <a:p>
             <a:fld id="{5F435959-F0A5-4E74-91C9-3CA03D403E3A}" type="datetimeFigureOut">
               <a:rPr kumimoji="1" lang="ja-JP" altLang="en-US" smtClean="0"/>
-              <a:t>2015/8/3</a:t>
+              <a:t>2016/7/3</a:t>
             </a:fld>
             <a:endParaRPr kumimoji="1" lang="ja-JP" altLang="en-US"/>
           </a:p>
@@ -2106,7 +2107,7 @@
           <a:p>
             <a:fld id="{5F435959-F0A5-4E74-91C9-3CA03D403E3A}" type="datetimeFigureOut">
               <a:rPr kumimoji="1" lang="ja-JP" altLang="en-US" smtClean="0"/>
-              <a:t>2015/8/3</a:t>
+              <a:t>2016/7/3</a:t>
             </a:fld>
             <a:endParaRPr kumimoji="1" lang="ja-JP" altLang="en-US"/>
           </a:p>
@@ -2201,7 +2202,7 @@
           <a:p>
             <a:fld id="{5F435959-F0A5-4E74-91C9-3CA03D403E3A}" type="datetimeFigureOut">
               <a:rPr kumimoji="1" lang="ja-JP" altLang="en-US" smtClean="0"/>
-              <a:t>2015/8/3</a:t>
+              <a:t>2016/7/3</a:t>
             </a:fld>
             <a:endParaRPr kumimoji="1" lang="ja-JP" altLang="en-US"/>
           </a:p>
@@ -2510,7 +2511,7 @@
           <a:p>
             <a:fld id="{5F435959-F0A5-4E74-91C9-3CA03D403E3A}" type="datetimeFigureOut">
               <a:rPr kumimoji="1" lang="ja-JP" altLang="en-US" smtClean="0"/>
-              <a:t>2015/8/3</a:t>
+              <a:t>2016/7/3</a:t>
             </a:fld>
             <a:endParaRPr kumimoji="1" lang="ja-JP" altLang="en-US"/>
           </a:p>
@@ -2763,7 +2764,7 @@
           <a:p>
             <a:fld id="{5F435959-F0A5-4E74-91C9-3CA03D403E3A}" type="datetimeFigureOut">
               <a:rPr kumimoji="1" lang="ja-JP" altLang="en-US" smtClean="0"/>
-              <a:t>2015/8/3</a:t>
+              <a:t>2016/7/3</a:t>
             </a:fld>
             <a:endParaRPr kumimoji="1" lang="ja-JP" altLang="en-US"/>
           </a:p>
@@ -3008,7 +3009,7 @@
           <a:p>
             <a:fld id="{5F435959-F0A5-4E74-91C9-3CA03D403E3A}" type="datetimeFigureOut">
               <a:rPr kumimoji="1" lang="ja-JP" altLang="en-US" smtClean="0"/>
-              <a:t>2015/8/3</a:t>
+              <a:t>2016/7/3</a:t>
             </a:fld>
             <a:endParaRPr kumimoji="1" lang="ja-JP" altLang="en-US"/>
           </a:p>
@@ -3763,6 +3764,380 @@
     <p:extLst>
       <p:ext uri="{BB962C8B-B14F-4D97-AF65-F5344CB8AC3E}">
         <p14:creationId xmlns:p14="http://schemas.microsoft.com/office/powerpoint/2010/main" val="2780260242"/>
+      </p:ext>
+    </p:extLst>
+  </p:cSld>
+  <p:clrMapOvr>
+    <a:masterClrMapping/>
+  </p:clrMapOvr>
+</p:sld>
+</file>
+
+<file path=ppt/slides/slide2.xml><?xml version="1.0" encoding="utf-8"?>
+<p:sld xmlns:a="http://schemas.openxmlformats.org/drawingml/2006/main" xmlns:r="http://schemas.openxmlformats.org/officeDocument/2006/relationships" xmlns:p="http://schemas.openxmlformats.org/presentationml/2006/main">
+  <p:cSld>
+    <p:spTree>
+      <p:nvGrpSpPr>
+        <p:cNvPr id="1" name=""/>
+        <p:cNvGrpSpPr/>
+        <p:nvPr/>
+      </p:nvGrpSpPr>
+      <p:grpSpPr>
+        <a:xfrm>
+          <a:off x="0" y="0"/>
+          <a:ext cx="0" cy="0"/>
+          <a:chOff x="0" y="0"/>
+          <a:chExt cx="0" cy="0"/>
+        </a:xfrm>
+      </p:grpSpPr>
+      <p:sp>
+        <p:nvSpPr>
+          <p:cNvPr id="7" name="ドーナツ 6"/>
+          <p:cNvSpPr/>
+          <p:nvPr/>
+        </p:nvSpPr>
+        <p:spPr>
+          <a:xfrm>
+            <a:off x="3041830" y="518370"/>
+            <a:ext cx="828092" cy="923425"/>
+          </a:xfrm>
+          <a:prstGeom prst="donut">
+            <a:avLst>
+              <a:gd name="adj" fmla="val 12542"/>
+            </a:avLst>
+          </a:prstGeom>
+          <a:solidFill>
+            <a:schemeClr val="bg1">
+              <a:lumMod val="65000"/>
+            </a:schemeClr>
+          </a:solidFill>
+          <a:ln>
+            <a:solidFill>
+              <a:schemeClr val="tx1"/>
+            </a:solidFill>
+          </a:ln>
+          <a:scene3d>
+            <a:camera prst="orthographicFront"/>
+            <a:lightRig rig="threePt" dir="t"/>
+          </a:scene3d>
+          <a:sp3d>
+            <a:bevelT w="165100" prst="coolSlant"/>
+          </a:sp3d>
+        </p:spPr>
+        <p:style>
+          <a:lnRef idx="2">
+            <a:schemeClr val="accent1">
+              <a:shade val="50000"/>
+            </a:schemeClr>
+          </a:lnRef>
+          <a:fillRef idx="1">
+            <a:schemeClr val="accent1"/>
+          </a:fillRef>
+          <a:effectRef idx="0">
+            <a:schemeClr val="accent1"/>
+          </a:effectRef>
+          <a:fontRef idx="minor">
+            <a:schemeClr val="lt1"/>
+          </a:fontRef>
+        </p:style>
+        <p:txBody>
+          <a:bodyPr rtlCol="0" anchor="ctr"/>
+          <a:lstStyle/>
+          <a:p>
+            <a:pPr algn="ctr"/>
+            <a:endParaRPr kumimoji="1" lang="ja-JP" altLang="en-US">
+              <a:solidFill>
+                <a:schemeClr val="tx1"/>
+              </a:solidFill>
+            </a:endParaRPr>
+          </a:p>
+        </p:txBody>
+      </p:sp>
+      <p:sp>
+        <p:nvSpPr>
+          <p:cNvPr id="5" name="角丸四角形 4"/>
+          <p:cNvSpPr/>
+          <p:nvPr/>
+        </p:nvSpPr>
+        <p:spPr>
+          <a:xfrm>
+            <a:off x="3234645" y="1071686"/>
+            <a:ext cx="442462" cy="472427"/>
+          </a:xfrm>
+          <a:prstGeom prst="roundRect">
+            <a:avLst>
+              <a:gd name="adj" fmla="val 25940"/>
+            </a:avLst>
+          </a:prstGeom>
+          <a:solidFill>
+            <a:srgbClr val="FF0000"/>
+          </a:solidFill>
+          <a:ln>
+            <a:solidFill>
+              <a:schemeClr val="tx1"/>
+            </a:solidFill>
+          </a:ln>
+          <a:scene3d>
+            <a:camera prst="orthographicFront"/>
+            <a:lightRig rig="threePt" dir="t"/>
+          </a:scene3d>
+          <a:sp3d>
+            <a:bevelT w="165100" prst="coolSlant"/>
+          </a:sp3d>
+        </p:spPr>
+        <p:style>
+          <a:lnRef idx="2">
+            <a:schemeClr val="accent1">
+              <a:shade val="50000"/>
+            </a:schemeClr>
+          </a:lnRef>
+          <a:fillRef idx="1">
+            <a:schemeClr val="accent1"/>
+          </a:fillRef>
+          <a:effectRef idx="0">
+            <a:schemeClr val="accent1"/>
+          </a:effectRef>
+          <a:fontRef idx="minor">
+            <a:schemeClr val="lt1"/>
+          </a:fontRef>
+        </p:style>
+        <p:txBody>
+          <a:bodyPr rtlCol="0" anchor="ctr"/>
+          <a:lstStyle/>
+          <a:p>
+            <a:pPr algn="ctr"/>
+            <a:endParaRPr kumimoji="1" lang="ja-JP" altLang="en-US"/>
+          </a:p>
+        </p:txBody>
+      </p:sp>
+      <p:sp>
+        <p:nvSpPr>
+          <p:cNvPr id="8" name="角丸四角形 7"/>
+          <p:cNvSpPr/>
+          <p:nvPr/>
+        </p:nvSpPr>
+        <p:spPr>
+          <a:xfrm>
+            <a:off x="2764426" y="1745091"/>
+            <a:ext cx="1368152" cy="2105972"/>
+          </a:xfrm>
+          <a:prstGeom prst="roundRect">
+            <a:avLst/>
+          </a:prstGeom>
+          <a:solidFill>
+            <a:schemeClr val="tx1"/>
+          </a:solidFill>
+          <a:ln>
+            <a:solidFill>
+              <a:schemeClr val="tx1"/>
+            </a:solidFill>
+          </a:ln>
+        </p:spPr>
+        <p:style>
+          <a:lnRef idx="2">
+            <a:schemeClr val="accent1">
+              <a:shade val="50000"/>
+            </a:schemeClr>
+          </a:lnRef>
+          <a:fillRef idx="1">
+            <a:schemeClr val="accent1"/>
+          </a:fillRef>
+          <a:effectRef idx="0">
+            <a:schemeClr val="accent1"/>
+          </a:effectRef>
+          <a:fontRef idx="minor">
+            <a:schemeClr val="lt1"/>
+          </a:fontRef>
+        </p:style>
+        <p:txBody>
+          <a:bodyPr rtlCol="0" anchor="ctr"/>
+          <a:lstStyle/>
+          <a:p>
+            <a:pPr algn="ctr"/>
+            <a:endParaRPr kumimoji="1" lang="ja-JP" altLang="en-US"/>
+          </a:p>
+        </p:txBody>
+      </p:sp>
+      <p:sp>
+        <p:nvSpPr>
+          <p:cNvPr id="9" name="角丸四角形 8"/>
+          <p:cNvSpPr/>
+          <p:nvPr/>
+        </p:nvSpPr>
+        <p:spPr>
+          <a:xfrm>
+            <a:off x="2923190" y="1956054"/>
+            <a:ext cx="1065371" cy="1390953"/>
+          </a:xfrm>
+          <a:prstGeom prst="roundRect">
+            <a:avLst/>
+          </a:prstGeom>
+        </p:spPr>
+        <p:style>
+          <a:lnRef idx="2">
+            <a:schemeClr val="accent1">
+              <a:shade val="50000"/>
+            </a:schemeClr>
+          </a:lnRef>
+          <a:fillRef idx="1">
+            <a:schemeClr val="accent1"/>
+          </a:fillRef>
+          <a:effectRef idx="0">
+            <a:schemeClr val="accent1"/>
+          </a:effectRef>
+          <a:fontRef idx="minor">
+            <a:schemeClr val="lt1"/>
+          </a:fontRef>
+        </p:style>
+        <p:txBody>
+          <a:bodyPr rtlCol="0" anchor="ctr"/>
+          <a:lstStyle/>
+          <a:p>
+            <a:pPr algn="ctr"/>
+            <a:endParaRPr kumimoji="1" lang="ja-JP" altLang="en-US"/>
+          </a:p>
+        </p:txBody>
+      </p:sp>
+      <p:sp>
+        <p:nvSpPr>
+          <p:cNvPr id="10" name="角丸四角形 9"/>
+          <p:cNvSpPr/>
+          <p:nvPr/>
+        </p:nvSpPr>
+        <p:spPr>
+          <a:xfrm>
+            <a:off x="3304486" y="3514516"/>
+            <a:ext cx="288032" cy="143370"/>
+          </a:xfrm>
+          <a:prstGeom prst="roundRect">
+            <a:avLst/>
+          </a:prstGeom>
+          <a:solidFill>
+            <a:schemeClr val="tx1"/>
+          </a:solidFill>
+          <a:ln>
+            <a:solidFill>
+              <a:schemeClr val="bg1">
+                <a:lumMod val="85000"/>
+              </a:schemeClr>
+            </a:solidFill>
+          </a:ln>
+        </p:spPr>
+        <p:style>
+          <a:lnRef idx="2">
+            <a:schemeClr val="accent1">
+              <a:shade val="50000"/>
+            </a:schemeClr>
+          </a:lnRef>
+          <a:fillRef idx="1">
+            <a:schemeClr val="accent1"/>
+          </a:fillRef>
+          <a:effectRef idx="0">
+            <a:schemeClr val="accent1"/>
+          </a:effectRef>
+          <a:fontRef idx="minor">
+            <a:schemeClr val="lt1"/>
+          </a:fontRef>
+        </p:style>
+        <p:txBody>
+          <a:bodyPr rtlCol="0" anchor="ctr"/>
+          <a:lstStyle/>
+          <a:p>
+            <a:pPr algn="ctr"/>
+            <a:endParaRPr kumimoji="1" lang="ja-JP" altLang="en-US"/>
+          </a:p>
+        </p:txBody>
+      </p:sp>
+      <p:sp>
+        <p:nvSpPr>
+          <p:cNvPr id="2" name="稲妻 1"/>
+          <p:cNvSpPr/>
+          <p:nvPr/>
+        </p:nvSpPr>
+        <p:spPr>
+          <a:xfrm>
+            <a:off x="2253694" y="1544113"/>
+            <a:ext cx="1182925" cy="1107417"/>
+          </a:xfrm>
+          <a:prstGeom prst="lightningBolt">
+            <a:avLst/>
+          </a:prstGeom>
+          <a:solidFill>
+            <a:srgbClr val="FFFF00"/>
+          </a:solidFill>
+        </p:spPr>
+        <p:style>
+          <a:lnRef idx="2">
+            <a:schemeClr val="accent1">
+              <a:shade val="50000"/>
+            </a:schemeClr>
+          </a:lnRef>
+          <a:fillRef idx="1">
+            <a:schemeClr val="accent1"/>
+          </a:fillRef>
+          <a:effectRef idx="0">
+            <a:schemeClr val="accent1"/>
+          </a:effectRef>
+          <a:fontRef idx="minor">
+            <a:schemeClr val="lt1"/>
+          </a:fontRef>
+        </p:style>
+        <p:txBody>
+          <a:bodyPr rtlCol="0" anchor="ctr"/>
+          <a:lstStyle/>
+          <a:p>
+            <a:pPr algn="ctr"/>
+            <a:endParaRPr kumimoji="1" lang="ja-JP" altLang="en-US"/>
+          </a:p>
+        </p:txBody>
+      </p:sp>
+      <p:sp>
+        <p:nvSpPr>
+          <p:cNvPr id="11" name="稲妻 10"/>
+          <p:cNvSpPr/>
+          <p:nvPr/>
+        </p:nvSpPr>
+        <p:spPr>
+          <a:xfrm flipH="1">
+            <a:off x="3387045" y="1947817"/>
+            <a:ext cx="1400979" cy="1107417"/>
+          </a:xfrm>
+          <a:prstGeom prst="lightningBolt">
+            <a:avLst/>
+          </a:prstGeom>
+          <a:solidFill>
+            <a:srgbClr val="FFFF00"/>
+          </a:solidFill>
+        </p:spPr>
+        <p:style>
+          <a:lnRef idx="2">
+            <a:schemeClr val="accent1">
+              <a:shade val="50000"/>
+            </a:schemeClr>
+          </a:lnRef>
+          <a:fillRef idx="1">
+            <a:schemeClr val="accent1"/>
+          </a:fillRef>
+          <a:effectRef idx="0">
+            <a:schemeClr val="accent1"/>
+          </a:effectRef>
+          <a:fontRef idx="minor">
+            <a:schemeClr val="lt1"/>
+          </a:fontRef>
+        </p:style>
+        <p:txBody>
+          <a:bodyPr rtlCol="0" anchor="ctr"/>
+          <a:lstStyle/>
+          <a:p>
+            <a:pPr algn="ctr"/>
+            <a:endParaRPr kumimoji="1" lang="ja-JP" altLang="en-US"/>
+          </a:p>
+        </p:txBody>
+      </p:sp>
+    </p:spTree>
+    <p:extLst>
+      <p:ext uri="{BB962C8B-B14F-4D97-AF65-F5344CB8AC3E}">
+        <p14:creationId xmlns:p14="http://schemas.microsoft.com/office/powerpoint/2010/main" val="3216425977"/>
       </p:ext>
     </p:extLst>
   </p:cSld>

</xml_diff>